<commit_message>
Modifica al diario di bordo
</commit_message>
<xml_diff>
--- a/templates/diario_di_bordo.pptx
+++ b/templates/diario_di_bordo.pptx
@@ -5,26 +5,29 @@
     <p:sldMasterId id="2147483648" r:id="rId1"/>
   </p:sldMasterIdLst>
   <p:notesMasterIdLst>
-    <p:notesMasterId r:id="rId4"/>
+    <p:notesMasterId r:id="rId7"/>
   </p:notesMasterIdLst>
   <p:sldIdLst>
     <p:sldId id="256" r:id="rId2"/>
     <p:sldId id="260" r:id="rId3"/>
+    <p:sldId id="261" r:id="rId4"/>
+    <p:sldId id="262" r:id="rId5"/>
+    <p:sldId id="263" r:id="rId6"/>
   </p:sldIdLst>
   <p:sldSz cx="12192000" cy="6858000"/>
   <p:notesSz cx="6858000" cy="9144000"/>
   <p:embeddedFontLst>
     <p:embeddedFont>
       <p:font typeface="Figtree" pitchFamily="2" charset="0"/>
-      <p:regular r:id="rId5"/>
-      <p:bold r:id="rId6"/>
-      <p:italic r:id="rId7"/>
-      <p:boldItalic r:id="rId8"/>
+      <p:regular r:id="rId8"/>
+      <p:bold r:id="rId9"/>
+      <p:italic r:id="rId10"/>
+      <p:boldItalic r:id="rId11"/>
     </p:embeddedFont>
     <p:embeddedFont>
       <p:font typeface="Figtree Medium" pitchFamily="2" charset="0"/>
-      <p:regular r:id="rId9"/>
-      <p:italic r:id="rId10"/>
+      <p:regular r:id="rId12"/>
+      <p:italic r:id="rId13"/>
     </p:embeddedFont>
   </p:embeddedFontLst>
   <p:defaultTextStyle>
@@ -212,7 +215,7 @@
           <a:p>
             <a:fld id="{D41C17CA-4C70-754D-AC47-C85E227CCEE2}" type="datetimeFigureOut">
               <a:rPr lang="it-IT" smtClean="0"/>
-              <a:t>30/10/24</a:t>
+              <a:t>10/11/24</a:t>
             </a:fld>
             <a:endParaRPr lang="it-IT"/>
           </a:p>
@@ -711,7 +714,7 @@
           <a:p>
             <a:fld id="{0414D644-D836-664C-8629-D7A68B2C6C68}" type="datetimeFigureOut">
               <a:rPr lang="en-US" smtClean="0"/>
-              <a:t>10/30/24</a:t>
+              <a:t>11/10/24</a:t>
             </a:fld>
             <a:endParaRPr lang="en-US"/>
           </a:p>
@@ -909,7 +912,7 @@
           <a:p>
             <a:fld id="{0414D644-D836-664C-8629-D7A68B2C6C68}" type="datetimeFigureOut">
               <a:rPr lang="en-US" smtClean="0"/>
-              <a:t>10/30/24</a:t>
+              <a:t>11/10/24</a:t>
             </a:fld>
             <a:endParaRPr lang="en-US"/>
           </a:p>
@@ -1117,7 +1120,7 @@
           <a:p>
             <a:fld id="{0414D644-D836-664C-8629-D7A68B2C6C68}" type="datetimeFigureOut">
               <a:rPr lang="en-US" smtClean="0"/>
-              <a:t>10/30/24</a:t>
+              <a:t>11/10/24</a:t>
             </a:fld>
             <a:endParaRPr lang="en-US"/>
           </a:p>
@@ -1315,7 +1318,7 @@
           <a:p>
             <a:fld id="{0414D644-D836-664C-8629-D7A68B2C6C68}" type="datetimeFigureOut">
               <a:rPr lang="en-US" smtClean="0"/>
-              <a:t>10/30/24</a:t>
+              <a:t>11/10/24</a:t>
             </a:fld>
             <a:endParaRPr lang="en-US"/>
           </a:p>
@@ -1590,7 +1593,7 @@
           <a:p>
             <a:fld id="{0414D644-D836-664C-8629-D7A68B2C6C68}" type="datetimeFigureOut">
               <a:rPr lang="en-US" smtClean="0"/>
-              <a:t>10/30/24</a:t>
+              <a:t>11/10/24</a:t>
             </a:fld>
             <a:endParaRPr lang="en-US"/>
           </a:p>
@@ -1855,7 +1858,7 @@
           <a:p>
             <a:fld id="{0414D644-D836-664C-8629-D7A68B2C6C68}" type="datetimeFigureOut">
               <a:rPr lang="en-US" smtClean="0"/>
-              <a:t>10/30/24</a:t>
+              <a:t>11/10/24</a:t>
             </a:fld>
             <a:endParaRPr lang="en-US"/>
           </a:p>
@@ -2267,7 +2270,7 @@
           <a:p>
             <a:fld id="{0414D644-D836-664C-8629-D7A68B2C6C68}" type="datetimeFigureOut">
               <a:rPr lang="en-US" smtClean="0"/>
-              <a:t>10/30/24</a:t>
+              <a:t>11/10/24</a:t>
             </a:fld>
             <a:endParaRPr lang="en-US"/>
           </a:p>
@@ -2408,7 +2411,7 @@
           <a:p>
             <a:fld id="{0414D644-D836-664C-8629-D7A68B2C6C68}" type="datetimeFigureOut">
               <a:rPr lang="en-US" smtClean="0"/>
-              <a:t>10/30/24</a:t>
+              <a:t>11/10/24</a:t>
             </a:fld>
             <a:endParaRPr lang="en-US"/>
           </a:p>
@@ -2521,7 +2524,7 @@
           <a:p>
             <a:fld id="{0414D644-D836-664C-8629-D7A68B2C6C68}" type="datetimeFigureOut">
               <a:rPr lang="en-US" smtClean="0"/>
-              <a:t>10/30/24</a:t>
+              <a:t>11/10/24</a:t>
             </a:fld>
             <a:endParaRPr lang="en-US"/>
           </a:p>
@@ -2832,7 +2835,7 @@
           <a:p>
             <a:fld id="{0414D644-D836-664C-8629-D7A68B2C6C68}" type="datetimeFigureOut">
               <a:rPr lang="en-US" smtClean="0"/>
-              <a:t>10/30/24</a:t>
+              <a:t>11/10/24</a:t>
             </a:fld>
             <a:endParaRPr lang="en-US"/>
           </a:p>
@@ -3120,7 +3123,7 @@
           <a:p>
             <a:fld id="{0414D644-D836-664C-8629-D7A68B2C6C68}" type="datetimeFigureOut">
               <a:rPr lang="en-US" smtClean="0"/>
-              <a:t>10/30/24</a:t>
+              <a:t>11/10/24</a:t>
             </a:fld>
             <a:endParaRPr lang="en-US"/>
           </a:p>
@@ -3361,7 +3364,7 @@
           <a:p>
             <a:fld id="{0414D644-D836-664C-8629-D7A68B2C6C68}" type="datetimeFigureOut">
               <a:rPr lang="en-US" smtClean="0"/>
-              <a:t>10/30/24</a:t>
+              <a:t>11/10/24</a:t>
             </a:fld>
             <a:endParaRPr lang="en-US"/>
           </a:p>
@@ -4009,7 +4012,7 @@
                 </a:solidFill>
                 <a:latin typeface="Figtree Medium" pitchFamily="2" charset="0"/>
               </a:rPr>
-              <a:t>Titolo</a:t>
+              <a:t>Cose fatte nel periodo trascorso</a:t>
             </a:r>
           </a:p>
         </p:txBody>
@@ -4257,6 +4260,1146 @@
     <p:extLst>
       <p:ext uri="{BB962C8B-B14F-4D97-AF65-F5344CB8AC3E}">
         <p14:creationId xmlns:p14="http://schemas.microsoft.com/office/powerpoint/2010/main" val="2451361119"/>
+      </p:ext>
+    </p:extLst>
+  </p:cSld>
+  <p:clrMapOvr>
+    <a:masterClrMapping/>
+  </p:clrMapOvr>
+</p:sld>
+</file>
+
+<file path=ppt/slides/slide3.xml><?xml version="1.0" encoding="utf-8"?>
+<p:sld xmlns:a="http://schemas.openxmlformats.org/drawingml/2006/main" xmlns:r="http://schemas.openxmlformats.org/officeDocument/2006/relationships" xmlns:p="http://schemas.openxmlformats.org/presentationml/2006/main">
+  <p:cSld>
+    <p:spTree>
+      <p:nvGrpSpPr>
+        <p:cNvPr id="1" name="">
+          <a:extLst>
+            <a:ext uri="{FF2B5EF4-FFF2-40B4-BE49-F238E27FC236}">
+              <a16:creationId xmlns:a16="http://schemas.microsoft.com/office/drawing/2014/main" id="{ACFC2604-C7AA-8073-F3BD-EB81E828EF7C}"/>
+            </a:ext>
+          </a:extLst>
+        </p:cNvPr>
+        <p:cNvGrpSpPr/>
+        <p:nvPr/>
+      </p:nvGrpSpPr>
+      <p:grpSpPr>
+        <a:xfrm>
+          <a:off x="0" y="0"/>
+          <a:ext cx="0" cy="0"/>
+          <a:chOff x="0" y="0"/>
+          <a:chExt cx="0" cy="0"/>
+        </a:xfrm>
+      </p:grpSpPr>
+      <p:sp>
+        <p:nvSpPr>
+          <p:cNvPr id="4" name="Rectangle 3">
+            <a:extLst>
+              <a:ext uri="{FF2B5EF4-FFF2-40B4-BE49-F238E27FC236}">
+                <a16:creationId xmlns:a16="http://schemas.microsoft.com/office/drawing/2014/main" id="{BD49206B-7334-98CB-9AA7-59A03D4AF1FD}"/>
+              </a:ext>
+            </a:extLst>
+          </p:cNvPr>
+          <p:cNvSpPr/>
+          <p:nvPr/>
+        </p:nvSpPr>
+        <p:spPr>
+          <a:xfrm>
+            <a:off x="0" y="0"/>
+            <a:ext cx="12192000" cy="1315844"/>
+          </a:xfrm>
+          <a:prstGeom prst="rect">
+            <a:avLst/>
+          </a:prstGeom>
+          <a:solidFill>
+            <a:schemeClr val="tx1"/>
+          </a:solidFill>
+          <a:ln>
+            <a:noFill/>
+          </a:ln>
+        </p:spPr>
+        <p:style>
+          <a:lnRef idx="2">
+            <a:schemeClr val="accent1">
+              <a:shade val="15000"/>
+            </a:schemeClr>
+          </a:lnRef>
+          <a:fillRef idx="1">
+            <a:schemeClr val="accent1"/>
+          </a:fillRef>
+          <a:effectRef idx="0">
+            <a:schemeClr val="accent1"/>
+          </a:effectRef>
+          <a:fontRef idx="minor">
+            <a:schemeClr val="lt1"/>
+          </a:fontRef>
+        </p:style>
+        <p:txBody>
+          <a:bodyPr rtlCol="0" anchor="ctr"/>
+          <a:lstStyle/>
+          <a:p>
+            <a:endParaRPr lang="it-IT" sz="3600" dirty="0">
+              <a:ln>
+                <a:solidFill>
+                  <a:sysClr val="windowText" lastClr="000000"/>
+                </a:solidFill>
+              </a:ln>
+              <a:solidFill>
+                <a:schemeClr val="bg1"/>
+              </a:solidFill>
+            </a:endParaRPr>
+          </a:p>
+        </p:txBody>
+      </p:sp>
+      <p:sp>
+        <p:nvSpPr>
+          <p:cNvPr id="7" name="TextBox 6">
+            <a:extLst>
+              <a:ext uri="{FF2B5EF4-FFF2-40B4-BE49-F238E27FC236}">
+                <a16:creationId xmlns:a16="http://schemas.microsoft.com/office/drawing/2014/main" id="{77A4D881-0EF1-0FBA-04EF-8D67ADA0E457}"/>
+              </a:ext>
+            </a:extLst>
+          </p:cNvPr>
+          <p:cNvSpPr txBox="1"/>
+          <p:nvPr/>
+        </p:nvSpPr>
+        <p:spPr>
+          <a:xfrm>
+            <a:off x="278780" y="303979"/>
+            <a:ext cx="10526752" cy="707886"/>
+          </a:xfrm>
+          <a:prstGeom prst="rect">
+            <a:avLst/>
+          </a:prstGeom>
+          <a:noFill/>
+        </p:spPr>
+        <p:txBody>
+          <a:bodyPr wrap="square" rtlCol="0">
+            <a:spAutoFit/>
+          </a:bodyPr>
+          <a:lstStyle/>
+          <a:p>
+            <a:r>
+              <a:rPr lang="it-IT" sz="4000" dirty="0">
+                <a:solidFill>
+                  <a:schemeClr val="bg1"/>
+                </a:solidFill>
+                <a:latin typeface="Figtree Medium" pitchFamily="2" charset="0"/>
+              </a:rPr>
+              <a:t>Cose da fare nel prossimo periodo</a:t>
+            </a:r>
+          </a:p>
+        </p:txBody>
+      </p:sp>
+      <p:sp>
+        <p:nvSpPr>
+          <p:cNvPr id="8" name="Segnaposto contenuto 4">
+            <a:extLst>
+              <a:ext uri="{FF2B5EF4-FFF2-40B4-BE49-F238E27FC236}">
+                <a16:creationId xmlns:a16="http://schemas.microsoft.com/office/drawing/2014/main" id="{075DF273-CCD5-1AF2-E94E-32C7C6443797}"/>
+              </a:ext>
+            </a:extLst>
+          </p:cNvPr>
+          <p:cNvSpPr txBox="1">
+            <a:spLocks/>
+          </p:cNvSpPr>
+          <p:nvPr/>
+        </p:nvSpPr>
+        <p:spPr>
+          <a:xfrm>
+            <a:off x="278780" y="1831694"/>
+            <a:ext cx="11329639" cy="4145359"/>
+          </a:xfrm>
+          <a:prstGeom prst="rect">
+            <a:avLst/>
+          </a:prstGeom>
+        </p:spPr>
+        <p:txBody>
+          <a:bodyPr vert="horz" lIns="91440" tIns="45720" rIns="91440" bIns="45720" rtlCol="0" anchor="t">
+            <a:normAutofit/>
+          </a:bodyPr>
+          <a:lstStyle>
+            <a:lvl1pPr marL="228600" indent="-228600" algn="l" defTabSz="914400" rtl="0" eaLnBrk="1" latinLnBrk="0" hangingPunct="1">
+              <a:lnSpc>
+                <a:spcPct val="90000"/>
+              </a:lnSpc>
+              <a:spcBef>
+                <a:spcPts val="1000"/>
+              </a:spcBef>
+              <a:buFont typeface="Arial" panose="020B0604020202020204" pitchFamily="34" charset="0"/>
+              <a:buChar char="•"/>
+              <a:defRPr sz="2800" kern="1200">
+                <a:solidFill>
+                  <a:schemeClr val="tx1"/>
+                </a:solidFill>
+                <a:latin typeface="+mn-lt"/>
+                <a:ea typeface="+mn-ea"/>
+                <a:cs typeface="+mn-cs"/>
+              </a:defRPr>
+            </a:lvl1pPr>
+            <a:lvl2pPr marL="685800" indent="-228600" algn="l" defTabSz="914400" rtl="0" eaLnBrk="1" latinLnBrk="0" hangingPunct="1">
+              <a:lnSpc>
+                <a:spcPct val="90000"/>
+              </a:lnSpc>
+              <a:spcBef>
+                <a:spcPts val="500"/>
+              </a:spcBef>
+              <a:buFont typeface="Arial" panose="020B0604020202020204" pitchFamily="34" charset="0"/>
+              <a:buChar char="•"/>
+              <a:defRPr sz="2400" kern="1200">
+                <a:solidFill>
+                  <a:schemeClr val="tx1"/>
+                </a:solidFill>
+                <a:latin typeface="+mn-lt"/>
+                <a:ea typeface="+mn-ea"/>
+                <a:cs typeface="+mn-cs"/>
+              </a:defRPr>
+            </a:lvl2pPr>
+            <a:lvl3pPr marL="1143000" indent="-228600" algn="l" defTabSz="914400" rtl="0" eaLnBrk="1" latinLnBrk="0" hangingPunct="1">
+              <a:lnSpc>
+                <a:spcPct val="90000"/>
+              </a:lnSpc>
+              <a:spcBef>
+                <a:spcPts val="500"/>
+              </a:spcBef>
+              <a:buFont typeface="Arial" panose="020B0604020202020204" pitchFamily="34" charset="0"/>
+              <a:buChar char="•"/>
+              <a:defRPr sz="2000" kern="1200">
+                <a:solidFill>
+                  <a:schemeClr val="tx1"/>
+                </a:solidFill>
+                <a:latin typeface="+mn-lt"/>
+                <a:ea typeface="+mn-ea"/>
+                <a:cs typeface="+mn-cs"/>
+              </a:defRPr>
+            </a:lvl3pPr>
+            <a:lvl4pPr marL="1600200" indent="-228600" algn="l" defTabSz="914400" rtl="0" eaLnBrk="1" latinLnBrk="0" hangingPunct="1">
+              <a:lnSpc>
+                <a:spcPct val="90000"/>
+              </a:lnSpc>
+              <a:spcBef>
+                <a:spcPts val="500"/>
+              </a:spcBef>
+              <a:buFont typeface="Arial" panose="020B0604020202020204" pitchFamily="34" charset="0"/>
+              <a:buChar char="•"/>
+              <a:defRPr sz="1800" kern="1200">
+                <a:solidFill>
+                  <a:schemeClr val="tx1"/>
+                </a:solidFill>
+                <a:latin typeface="+mn-lt"/>
+                <a:ea typeface="+mn-ea"/>
+                <a:cs typeface="+mn-cs"/>
+              </a:defRPr>
+            </a:lvl4pPr>
+            <a:lvl5pPr marL="2057400" indent="-228600" algn="l" defTabSz="914400" rtl="0" eaLnBrk="1" latinLnBrk="0" hangingPunct="1">
+              <a:lnSpc>
+                <a:spcPct val="90000"/>
+              </a:lnSpc>
+              <a:spcBef>
+                <a:spcPts val="500"/>
+              </a:spcBef>
+              <a:buFont typeface="Arial" panose="020B0604020202020204" pitchFamily="34" charset="0"/>
+              <a:buChar char="•"/>
+              <a:defRPr sz="1800" kern="1200">
+                <a:solidFill>
+                  <a:schemeClr val="tx1"/>
+                </a:solidFill>
+                <a:latin typeface="+mn-lt"/>
+                <a:ea typeface="+mn-ea"/>
+                <a:cs typeface="+mn-cs"/>
+              </a:defRPr>
+            </a:lvl5pPr>
+            <a:lvl6pPr marL="2514600" indent="-228600" algn="l" defTabSz="914400" rtl="0" eaLnBrk="1" latinLnBrk="0" hangingPunct="1">
+              <a:lnSpc>
+                <a:spcPct val="90000"/>
+              </a:lnSpc>
+              <a:spcBef>
+                <a:spcPts val="500"/>
+              </a:spcBef>
+              <a:buFont typeface="Arial" panose="020B0604020202020204" pitchFamily="34" charset="0"/>
+              <a:buChar char="•"/>
+              <a:defRPr sz="1800" kern="1200">
+                <a:solidFill>
+                  <a:schemeClr val="tx1"/>
+                </a:solidFill>
+                <a:latin typeface="+mn-lt"/>
+                <a:ea typeface="+mn-ea"/>
+                <a:cs typeface="+mn-cs"/>
+              </a:defRPr>
+            </a:lvl6pPr>
+            <a:lvl7pPr marL="2971800" indent="-228600" algn="l" defTabSz="914400" rtl="0" eaLnBrk="1" latinLnBrk="0" hangingPunct="1">
+              <a:lnSpc>
+                <a:spcPct val="90000"/>
+              </a:lnSpc>
+              <a:spcBef>
+                <a:spcPts val="500"/>
+              </a:spcBef>
+              <a:buFont typeface="Arial" panose="020B0604020202020204" pitchFamily="34" charset="0"/>
+              <a:buChar char="•"/>
+              <a:defRPr sz="1800" kern="1200">
+                <a:solidFill>
+                  <a:schemeClr val="tx1"/>
+                </a:solidFill>
+                <a:latin typeface="+mn-lt"/>
+                <a:ea typeface="+mn-ea"/>
+                <a:cs typeface="+mn-cs"/>
+              </a:defRPr>
+            </a:lvl7pPr>
+            <a:lvl8pPr marL="3429000" indent="-228600" algn="l" defTabSz="914400" rtl="0" eaLnBrk="1" latinLnBrk="0" hangingPunct="1">
+              <a:lnSpc>
+                <a:spcPct val="90000"/>
+              </a:lnSpc>
+              <a:spcBef>
+                <a:spcPts val="500"/>
+              </a:spcBef>
+              <a:buFont typeface="Arial" panose="020B0604020202020204" pitchFamily="34" charset="0"/>
+              <a:buChar char="•"/>
+              <a:defRPr sz="1800" kern="1200">
+                <a:solidFill>
+                  <a:schemeClr val="tx1"/>
+                </a:solidFill>
+                <a:latin typeface="+mn-lt"/>
+                <a:ea typeface="+mn-ea"/>
+                <a:cs typeface="+mn-cs"/>
+              </a:defRPr>
+            </a:lvl8pPr>
+            <a:lvl9pPr marL="3886200" indent="-228600" algn="l" defTabSz="914400" rtl="0" eaLnBrk="1" latinLnBrk="0" hangingPunct="1">
+              <a:lnSpc>
+                <a:spcPct val="90000"/>
+              </a:lnSpc>
+              <a:spcBef>
+                <a:spcPts val="500"/>
+              </a:spcBef>
+              <a:buFont typeface="Arial" panose="020B0604020202020204" pitchFamily="34" charset="0"/>
+              <a:buChar char="•"/>
+              <a:defRPr sz="1800" kern="1200">
+                <a:solidFill>
+                  <a:schemeClr val="tx1"/>
+                </a:solidFill>
+                <a:latin typeface="+mn-lt"/>
+                <a:ea typeface="+mn-ea"/>
+                <a:cs typeface="+mn-cs"/>
+              </a:defRPr>
+            </a:lvl9pPr>
+          </a:lstStyle>
+          <a:p>
+            <a:r>
+              <a:rPr lang="it-IT" sz="3200" dirty="0">
+                <a:latin typeface="Figtree" pitchFamily="2" charset="0"/>
+                <a:ea typeface="Verdana"/>
+                <a:cs typeface="Arial"/>
+              </a:rPr>
+              <a:t>Contenuto</a:t>
+            </a:r>
+          </a:p>
+        </p:txBody>
+      </p:sp>
+      <p:pic>
+        <p:nvPicPr>
+          <p:cNvPr id="10" name="Graphic 9">
+            <a:extLst>
+              <a:ext uri="{FF2B5EF4-FFF2-40B4-BE49-F238E27FC236}">
+                <a16:creationId xmlns:a16="http://schemas.microsoft.com/office/drawing/2014/main" id="{BAB779FD-33C3-B8F6-C45F-06FB52EC845D}"/>
+              </a:ext>
+            </a:extLst>
+          </p:cNvPr>
+          <p:cNvPicPr>
+            <a:picLocks noChangeAspect="1"/>
+          </p:cNvPicPr>
+          <p:nvPr/>
+        </p:nvPicPr>
+        <p:blipFill>
+          <a:blip r:embed="rId2">
+            <a:extLst>
+              <a:ext uri="{96DAC541-7B7A-43D3-8B79-37D633B846F1}">
+                <asvg:svgBlip xmlns:asvg="http://schemas.microsoft.com/office/drawing/2016/SVG/main" r:embed="rId3"/>
+              </a:ext>
+            </a:extLst>
+          </a:blip>
+          <a:stretch>
+            <a:fillRect/>
+          </a:stretch>
+        </p:blipFill>
+        <p:spPr>
+          <a:xfrm>
+            <a:off x="11552664" y="5965902"/>
+            <a:ext cx="477412" cy="763859"/>
+          </a:xfrm>
+          <a:prstGeom prst="rect">
+            <a:avLst/>
+          </a:prstGeom>
+        </p:spPr>
+      </p:pic>
+    </p:spTree>
+    <p:extLst>
+      <p:ext uri="{BB962C8B-B14F-4D97-AF65-F5344CB8AC3E}">
+        <p14:creationId xmlns:p14="http://schemas.microsoft.com/office/powerpoint/2010/main" val="266874767"/>
+      </p:ext>
+    </p:extLst>
+  </p:cSld>
+  <p:clrMapOvr>
+    <a:masterClrMapping/>
+  </p:clrMapOvr>
+</p:sld>
+</file>
+
+<file path=ppt/slides/slide4.xml><?xml version="1.0" encoding="utf-8"?>
+<p:sld xmlns:a="http://schemas.openxmlformats.org/drawingml/2006/main" xmlns:r="http://schemas.openxmlformats.org/officeDocument/2006/relationships" xmlns:p="http://schemas.openxmlformats.org/presentationml/2006/main">
+  <p:cSld>
+    <p:spTree>
+      <p:nvGrpSpPr>
+        <p:cNvPr id="1" name="">
+          <a:extLst>
+            <a:ext uri="{FF2B5EF4-FFF2-40B4-BE49-F238E27FC236}">
+              <a16:creationId xmlns:a16="http://schemas.microsoft.com/office/drawing/2014/main" id="{2EA68C41-4871-4EE1-7EAC-C28B5EFEE1F2}"/>
+            </a:ext>
+          </a:extLst>
+        </p:cNvPr>
+        <p:cNvGrpSpPr/>
+        <p:nvPr/>
+      </p:nvGrpSpPr>
+      <p:grpSpPr>
+        <a:xfrm>
+          <a:off x="0" y="0"/>
+          <a:ext cx="0" cy="0"/>
+          <a:chOff x="0" y="0"/>
+          <a:chExt cx="0" cy="0"/>
+        </a:xfrm>
+      </p:grpSpPr>
+      <p:sp>
+        <p:nvSpPr>
+          <p:cNvPr id="4" name="Rectangle 3">
+            <a:extLst>
+              <a:ext uri="{FF2B5EF4-FFF2-40B4-BE49-F238E27FC236}">
+                <a16:creationId xmlns:a16="http://schemas.microsoft.com/office/drawing/2014/main" id="{1B093974-6148-88D8-228D-B549AD64DE5B}"/>
+              </a:ext>
+            </a:extLst>
+          </p:cNvPr>
+          <p:cNvSpPr/>
+          <p:nvPr/>
+        </p:nvSpPr>
+        <p:spPr>
+          <a:xfrm>
+            <a:off x="0" y="0"/>
+            <a:ext cx="12192000" cy="1315844"/>
+          </a:xfrm>
+          <a:prstGeom prst="rect">
+            <a:avLst/>
+          </a:prstGeom>
+          <a:solidFill>
+            <a:schemeClr val="tx1"/>
+          </a:solidFill>
+          <a:ln>
+            <a:noFill/>
+          </a:ln>
+        </p:spPr>
+        <p:style>
+          <a:lnRef idx="2">
+            <a:schemeClr val="accent1">
+              <a:shade val="15000"/>
+            </a:schemeClr>
+          </a:lnRef>
+          <a:fillRef idx="1">
+            <a:schemeClr val="accent1"/>
+          </a:fillRef>
+          <a:effectRef idx="0">
+            <a:schemeClr val="accent1"/>
+          </a:effectRef>
+          <a:fontRef idx="minor">
+            <a:schemeClr val="lt1"/>
+          </a:fontRef>
+        </p:style>
+        <p:txBody>
+          <a:bodyPr rtlCol="0" anchor="ctr"/>
+          <a:lstStyle/>
+          <a:p>
+            <a:endParaRPr lang="it-IT" sz="3600" dirty="0">
+              <a:ln>
+                <a:solidFill>
+                  <a:sysClr val="windowText" lastClr="000000"/>
+                </a:solidFill>
+              </a:ln>
+              <a:solidFill>
+                <a:schemeClr val="bg1"/>
+              </a:solidFill>
+            </a:endParaRPr>
+          </a:p>
+        </p:txBody>
+      </p:sp>
+      <p:sp>
+        <p:nvSpPr>
+          <p:cNvPr id="7" name="TextBox 6">
+            <a:extLst>
+              <a:ext uri="{FF2B5EF4-FFF2-40B4-BE49-F238E27FC236}">
+                <a16:creationId xmlns:a16="http://schemas.microsoft.com/office/drawing/2014/main" id="{4B95514F-EDFC-7DD1-D70C-D7E6387C9B47}"/>
+              </a:ext>
+            </a:extLst>
+          </p:cNvPr>
+          <p:cNvSpPr txBox="1"/>
+          <p:nvPr/>
+        </p:nvSpPr>
+        <p:spPr>
+          <a:xfrm>
+            <a:off x="278780" y="303979"/>
+            <a:ext cx="10526752" cy="707886"/>
+          </a:xfrm>
+          <a:prstGeom prst="rect">
+            <a:avLst/>
+          </a:prstGeom>
+          <a:noFill/>
+        </p:spPr>
+        <p:txBody>
+          <a:bodyPr wrap="square" rtlCol="0">
+            <a:spAutoFit/>
+          </a:bodyPr>
+          <a:lstStyle/>
+          <a:p>
+            <a:r>
+              <a:rPr lang="it-IT" sz="4000" dirty="0">
+                <a:solidFill>
+                  <a:schemeClr val="bg1"/>
+                </a:solidFill>
+                <a:latin typeface="Figtree Medium" pitchFamily="2" charset="0"/>
+              </a:rPr>
+              <a:t>Difficoltà riscontrate</a:t>
+            </a:r>
+          </a:p>
+        </p:txBody>
+      </p:sp>
+      <p:sp>
+        <p:nvSpPr>
+          <p:cNvPr id="8" name="Segnaposto contenuto 4">
+            <a:extLst>
+              <a:ext uri="{FF2B5EF4-FFF2-40B4-BE49-F238E27FC236}">
+                <a16:creationId xmlns:a16="http://schemas.microsoft.com/office/drawing/2014/main" id="{9E2B478A-AB2F-E279-A700-0C8F358F9DB8}"/>
+              </a:ext>
+            </a:extLst>
+          </p:cNvPr>
+          <p:cNvSpPr txBox="1">
+            <a:spLocks/>
+          </p:cNvSpPr>
+          <p:nvPr/>
+        </p:nvSpPr>
+        <p:spPr>
+          <a:xfrm>
+            <a:off x="278780" y="1831694"/>
+            <a:ext cx="11329639" cy="4145359"/>
+          </a:xfrm>
+          <a:prstGeom prst="rect">
+            <a:avLst/>
+          </a:prstGeom>
+        </p:spPr>
+        <p:txBody>
+          <a:bodyPr vert="horz" lIns="91440" tIns="45720" rIns="91440" bIns="45720" rtlCol="0" anchor="t">
+            <a:normAutofit/>
+          </a:bodyPr>
+          <a:lstStyle>
+            <a:lvl1pPr marL="228600" indent="-228600" algn="l" defTabSz="914400" rtl="0" eaLnBrk="1" latinLnBrk="0" hangingPunct="1">
+              <a:lnSpc>
+                <a:spcPct val="90000"/>
+              </a:lnSpc>
+              <a:spcBef>
+                <a:spcPts val="1000"/>
+              </a:spcBef>
+              <a:buFont typeface="Arial" panose="020B0604020202020204" pitchFamily="34" charset="0"/>
+              <a:buChar char="•"/>
+              <a:defRPr sz="2800" kern="1200">
+                <a:solidFill>
+                  <a:schemeClr val="tx1"/>
+                </a:solidFill>
+                <a:latin typeface="+mn-lt"/>
+                <a:ea typeface="+mn-ea"/>
+                <a:cs typeface="+mn-cs"/>
+              </a:defRPr>
+            </a:lvl1pPr>
+            <a:lvl2pPr marL="685800" indent="-228600" algn="l" defTabSz="914400" rtl="0" eaLnBrk="1" latinLnBrk="0" hangingPunct="1">
+              <a:lnSpc>
+                <a:spcPct val="90000"/>
+              </a:lnSpc>
+              <a:spcBef>
+                <a:spcPts val="500"/>
+              </a:spcBef>
+              <a:buFont typeface="Arial" panose="020B0604020202020204" pitchFamily="34" charset="0"/>
+              <a:buChar char="•"/>
+              <a:defRPr sz="2400" kern="1200">
+                <a:solidFill>
+                  <a:schemeClr val="tx1"/>
+                </a:solidFill>
+                <a:latin typeface="+mn-lt"/>
+                <a:ea typeface="+mn-ea"/>
+                <a:cs typeface="+mn-cs"/>
+              </a:defRPr>
+            </a:lvl2pPr>
+            <a:lvl3pPr marL="1143000" indent="-228600" algn="l" defTabSz="914400" rtl="0" eaLnBrk="1" latinLnBrk="0" hangingPunct="1">
+              <a:lnSpc>
+                <a:spcPct val="90000"/>
+              </a:lnSpc>
+              <a:spcBef>
+                <a:spcPts val="500"/>
+              </a:spcBef>
+              <a:buFont typeface="Arial" panose="020B0604020202020204" pitchFamily="34" charset="0"/>
+              <a:buChar char="•"/>
+              <a:defRPr sz="2000" kern="1200">
+                <a:solidFill>
+                  <a:schemeClr val="tx1"/>
+                </a:solidFill>
+                <a:latin typeface="+mn-lt"/>
+                <a:ea typeface="+mn-ea"/>
+                <a:cs typeface="+mn-cs"/>
+              </a:defRPr>
+            </a:lvl3pPr>
+            <a:lvl4pPr marL="1600200" indent="-228600" algn="l" defTabSz="914400" rtl="0" eaLnBrk="1" latinLnBrk="0" hangingPunct="1">
+              <a:lnSpc>
+                <a:spcPct val="90000"/>
+              </a:lnSpc>
+              <a:spcBef>
+                <a:spcPts val="500"/>
+              </a:spcBef>
+              <a:buFont typeface="Arial" panose="020B0604020202020204" pitchFamily="34" charset="0"/>
+              <a:buChar char="•"/>
+              <a:defRPr sz="1800" kern="1200">
+                <a:solidFill>
+                  <a:schemeClr val="tx1"/>
+                </a:solidFill>
+                <a:latin typeface="+mn-lt"/>
+                <a:ea typeface="+mn-ea"/>
+                <a:cs typeface="+mn-cs"/>
+              </a:defRPr>
+            </a:lvl4pPr>
+            <a:lvl5pPr marL="2057400" indent="-228600" algn="l" defTabSz="914400" rtl="0" eaLnBrk="1" latinLnBrk="0" hangingPunct="1">
+              <a:lnSpc>
+                <a:spcPct val="90000"/>
+              </a:lnSpc>
+              <a:spcBef>
+                <a:spcPts val="500"/>
+              </a:spcBef>
+              <a:buFont typeface="Arial" panose="020B0604020202020204" pitchFamily="34" charset="0"/>
+              <a:buChar char="•"/>
+              <a:defRPr sz="1800" kern="1200">
+                <a:solidFill>
+                  <a:schemeClr val="tx1"/>
+                </a:solidFill>
+                <a:latin typeface="+mn-lt"/>
+                <a:ea typeface="+mn-ea"/>
+                <a:cs typeface="+mn-cs"/>
+              </a:defRPr>
+            </a:lvl5pPr>
+            <a:lvl6pPr marL="2514600" indent="-228600" algn="l" defTabSz="914400" rtl="0" eaLnBrk="1" latinLnBrk="0" hangingPunct="1">
+              <a:lnSpc>
+                <a:spcPct val="90000"/>
+              </a:lnSpc>
+              <a:spcBef>
+                <a:spcPts val="500"/>
+              </a:spcBef>
+              <a:buFont typeface="Arial" panose="020B0604020202020204" pitchFamily="34" charset="0"/>
+              <a:buChar char="•"/>
+              <a:defRPr sz="1800" kern="1200">
+                <a:solidFill>
+                  <a:schemeClr val="tx1"/>
+                </a:solidFill>
+                <a:latin typeface="+mn-lt"/>
+                <a:ea typeface="+mn-ea"/>
+                <a:cs typeface="+mn-cs"/>
+              </a:defRPr>
+            </a:lvl6pPr>
+            <a:lvl7pPr marL="2971800" indent="-228600" algn="l" defTabSz="914400" rtl="0" eaLnBrk="1" latinLnBrk="0" hangingPunct="1">
+              <a:lnSpc>
+                <a:spcPct val="90000"/>
+              </a:lnSpc>
+              <a:spcBef>
+                <a:spcPts val="500"/>
+              </a:spcBef>
+              <a:buFont typeface="Arial" panose="020B0604020202020204" pitchFamily="34" charset="0"/>
+              <a:buChar char="•"/>
+              <a:defRPr sz="1800" kern="1200">
+                <a:solidFill>
+                  <a:schemeClr val="tx1"/>
+                </a:solidFill>
+                <a:latin typeface="+mn-lt"/>
+                <a:ea typeface="+mn-ea"/>
+                <a:cs typeface="+mn-cs"/>
+              </a:defRPr>
+            </a:lvl7pPr>
+            <a:lvl8pPr marL="3429000" indent="-228600" algn="l" defTabSz="914400" rtl="0" eaLnBrk="1" latinLnBrk="0" hangingPunct="1">
+              <a:lnSpc>
+                <a:spcPct val="90000"/>
+              </a:lnSpc>
+              <a:spcBef>
+                <a:spcPts val="500"/>
+              </a:spcBef>
+              <a:buFont typeface="Arial" panose="020B0604020202020204" pitchFamily="34" charset="0"/>
+              <a:buChar char="•"/>
+              <a:defRPr sz="1800" kern="1200">
+                <a:solidFill>
+                  <a:schemeClr val="tx1"/>
+                </a:solidFill>
+                <a:latin typeface="+mn-lt"/>
+                <a:ea typeface="+mn-ea"/>
+                <a:cs typeface="+mn-cs"/>
+              </a:defRPr>
+            </a:lvl8pPr>
+            <a:lvl9pPr marL="3886200" indent="-228600" algn="l" defTabSz="914400" rtl="0" eaLnBrk="1" latinLnBrk="0" hangingPunct="1">
+              <a:lnSpc>
+                <a:spcPct val="90000"/>
+              </a:lnSpc>
+              <a:spcBef>
+                <a:spcPts val="500"/>
+              </a:spcBef>
+              <a:buFont typeface="Arial" panose="020B0604020202020204" pitchFamily="34" charset="0"/>
+              <a:buChar char="•"/>
+              <a:defRPr sz="1800" kern="1200">
+                <a:solidFill>
+                  <a:schemeClr val="tx1"/>
+                </a:solidFill>
+                <a:latin typeface="+mn-lt"/>
+                <a:ea typeface="+mn-ea"/>
+                <a:cs typeface="+mn-cs"/>
+              </a:defRPr>
+            </a:lvl9pPr>
+          </a:lstStyle>
+          <a:p>
+            <a:r>
+              <a:rPr lang="it-IT" sz="3200" dirty="0">
+                <a:latin typeface="Figtree" pitchFamily="2" charset="0"/>
+                <a:ea typeface="Verdana"/>
+                <a:cs typeface="Arial"/>
+              </a:rPr>
+              <a:t>Contenuto</a:t>
+            </a:r>
+          </a:p>
+        </p:txBody>
+      </p:sp>
+      <p:pic>
+        <p:nvPicPr>
+          <p:cNvPr id="10" name="Graphic 9">
+            <a:extLst>
+              <a:ext uri="{FF2B5EF4-FFF2-40B4-BE49-F238E27FC236}">
+                <a16:creationId xmlns:a16="http://schemas.microsoft.com/office/drawing/2014/main" id="{5623D325-3EF6-B585-DB26-AA40AB8EB6F4}"/>
+              </a:ext>
+            </a:extLst>
+          </p:cNvPr>
+          <p:cNvPicPr>
+            <a:picLocks noChangeAspect="1"/>
+          </p:cNvPicPr>
+          <p:nvPr/>
+        </p:nvPicPr>
+        <p:blipFill>
+          <a:blip r:embed="rId2">
+            <a:extLst>
+              <a:ext uri="{96DAC541-7B7A-43D3-8B79-37D633B846F1}">
+                <asvg:svgBlip xmlns:asvg="http://schemas.microsoft.com/office/drawing/2016/SVG/main" r:embed="rId3"/>
+              </a:ext>
+            </a:extLst>
+          </a:blip>
+          <a:stretch>
+            <a:fillRect/>
+          </a:stretch>
+        </p:blipFill>
+        <p:spPr>
+          <a:xfrm>
+            <a:off x="11552664" y="5965902"/>
+            <a:ext cx="477412" cy="763859"/>
+          </a:xfrm>
+          <a:prstGeom prst="rect">
+            <a:avLst/>
+          </a:prstGeom>
+        </p:spPr>
+      </p:pic>
+    </p:spTree>
+    <p:extLst>
+      <p:ext uri="{BB962C8B-B14F-4D97-AF65-F5344CB8AC3E}">
+        <p14:creationId xmlns:p14="http://schemas.microsoft.com/office/powerpoint/2010/main" val="299326661"/>
+      </p:ext>
+    </p:extLst>
+  </p:cSld>
+  <p:clrMapOvr>
+    <a:masterClrMapping/>
+  </p:clrMapOvr>
+</p:sld>
+</file>
+
+<file path=ppt/slides/slide5.xml><?xml version="1.0" encoding="utf-8"?>
+<p:sld xmlns:a="http://schemas.openxmlformats.org/drawingml/2006/main" xmlns:r="http://schemas.openxmlformats.org/officeDocument/2006/relationships" xmlns:p="http://schemas.openxmlformats.org/presentationml/2006/main">
+  <p:cSld>
+    <p:spTree>
+      <p:nvGrpSpPr>
+        <p:cNvPr id="1" name="">
+          <a:extLst>
+            <a:ext uri="{FF2B5EF4-FFF2-40B4-BE49-F238E27FC236}">
+              <a16:creationId xmlns:a16="http://schemas.microsoft.com/office/drawing/2014/main" id="{AA9C4BBF-E851-4514-2796-A33C17E86B3E}"/>
+            </a:ext>
+          </a:extLst>
+        </p:cNvPr>
+        <p:cNvGrpSpPr/>
+        <p:nvPr/>
+      </p:nvGrpSpPr>
+      <p:grpSpPr>
+        <a:xfrm>
+          <a:off x="0" y="0"/>
+          <a:ext cx="0" cy="0"/>
+          <a:chOff x="0" y="0"/>
+          <a:chExt cx="0" cy="0"/>
+        </a:xfrm>
+      </p:grpSpPr>
+      <p:sp>
+        <p:nvSpPr>
+          <p:cNvPr id="4" name="Rectangle 3">
+            <a:extLst>
+              <a:ext uri="{FF2B5EF4-FFF2-40B4-BE49-F238E27FC236}">
+                <a16:creationId xmlns:a16="http://schemas.microsoft.com/office/drawing/2014/main" id="{4D8934EC-CA62-EF9B-3332-E3A0638D1656}"/>
+              </a:ext>
+            </a:extLst>
+          </p:cNvPr>
+          <p:cNvSpPr/>
+          <p:nvPr/>
+        </p:nvSpPr>
+        <p:spPr>
+          <a:xfrm>
+            <a:off x="0" y="0"/>
+            <a:ext cx="12192000" cy="1315844"/>
+          </a:xfrm>
+          <a:prstGeom prst="rect">
+            <a:avLst/>
+          </a:prstGeom>
+          <a:solidFill>
+            <a:schemeClr val="tx1"/>
+          </a:solidFill>
+          <a:ln>
+            <a:noFill/>
+          </a:ln>
+        </p:spPr>
+        <p:style>
+          <a:lnRef idx="2">
+            <a:schemeClr val="accent1">
+              <a:shade val="15000"/>
+            </a:schemeClr>
+          </a:lnRef>
+          <a:fillRef idx="1">
+            <a:schemeClr val="accent1"/>
+          </a:fillRef>
+          <a:effectRef idx="0">
+            <a:schemeClr val="accent1"/>
+          </a:effectRef>
+          <a:fontRef idx="minor">
+            <a:schemeClr val="lt1"/>
+          </a:fontRef>
+        </p:style>
+        <p:txBody>
+          <a:bodyPr rtlCol="0" anchor="ctr"/>
+          <a:lstStyle/>
+          <a:p>
+            <a:endParaRPr lang="it-IT" sz="3600" dirty="0">
+              <a:ln>
+                <a:solidFill>
+                  <a:sysClr val="windowText" lastClr="000000"/>
+                </a:solidFill>
+              </a:ln>
+              <a:solidFill>
+                <a:schemeClr val="bg1"/>
+              </a:solidFill>
+            </a:endParaRPr>
+          </a:p>
+        </p:txBody>
+      </p:sp>
+      <p:sp>
+        <p:nvSpPr>
+          <p:cNvPr id="7" name="TextBox 6">
+            <a:extLst>
+              <a:ext uri="{FF2B5EF4-FFF2-40B4-BE49-F238E27FC236}">
+                <a16:creationId xmlns:a16="http://schemas.microsoft.com/office/drawing/2014/main" id="{390EF4AF-D182-2848-53B4-45239E4D7E27}"/>
+              </a:ext>
+            </a:extLst>
+          </p:cNvPr>
+          <p:cNvSpPr txBox="1"/>
+          <p:nvPr/>
+        </p:nvSpPr>
+        <p:spPr>
+          <a:xfrm>
+            <a:off x="278780" y="303979"/>
+            <a:ext cx="10526752" cy="707886"/>
+          </a:xfrm>
+          <a:prstGeom prst="rect">
+            <a:avLst/>
+          </a:prstGeom>
+          <a:noFill/>
+        </p:spPr>
+        <p:txBody>
+          <a:bodyPr wrap="square" rtlCol="0">
+            <a:spAutoFit/>
+          </a:bodyPr>
+          <a:lstStyle/>
+          <a:p>
+            <a:r>
+              <a:rPr lang="it-IT" sz="4000" dirty="0">
+                <a:solidFill>
+                  <a:schemeClr val="bg1"/>
+                </a:solidFill>
+                <a:latin typeface="Figtree Medium" pitchFamily="2" charset="0"/>
+              </a:rPr>
+              <a:t>Dubbi e incertezze su </a:t>
+            </a:r>
+            <a:r>
+              <a:rPr lang="it-IT" sz="4000">
+                <a:solidFill>
+                  <a:schemeClr val="bg1"/>
+                </a:solidFill>
+                <a:latin typeface="Figtree Medium" pitchFamily="2" charset="0"/>
+              </a:rPr>
+              <a:t>come procedere</a:t>
+            </a:r>
+            <a:endParaRPr lang="it-IT" sz="4000" dirty="0">
+              <a:solidFill>
+                <a:schemeClr val="bg1"/>
+              </a:solidFill>
+              <a:latin typeface="Figtree Medium" pitchFamily="2" charset="0"/>
+            </a:endParaRPr>
+          </a:p>
+        </p:txBody>
+      </p:sp>
+      <p:sp>
+        <p:nvSpPr>
+          <p:cNvPr id="8" name="Segnaposto contenuto 4">
+            <a:extLst>
+              <a:ext uri="{FF2B5EF4-FFF2-40B4-BE49-F238E27FC236}">
+                <a16:creationId xmlns:a16="http://schemas.microsoft.com/office/drawing/2014/main" id="{6205ECA2-0851-6429-F159-EBA98F1B5449}"/>
+              </a:ext>
+            </a:extLst>
+          </p:cNvPr>
+          <p:cNvSpPr txBox="1">
+            <a:spLocks/>
+          </p:cNvSpPr>
+          <p:nvPr/>
+        </p:nvSpPr>
+        <p:spPr>
+          <a:xfrm>
+            <a:off x="278780" y="1831694"/>
+            <a:ext cx="11329639" cy="4145359"/>
+          </a:xfrm>
+          <a:prstGeom prst="rect">
+            <a:avLst/>
+          </a:prstGeom>
+        </p:spPr>
+        <p:txBody>
+          <a:bodyPr vert="horz" lIns="91440" tIns="45720" rIns="91440" bIns="45720" rtlCol="0" anchor="t">
+            <a:normAutofit/>
+          </a:bodyPr>
+          <a:lstStyle>
+            <a:lvl1pPr marL="228600" indent="-228600" algn="l" defTabSz="914400" rtl="0" eaLnBrk="1" latinLnBrk="0" hangingPunct="1">
+              <a:lnSpc>
+                <a:spcPct val="90000"/>
+              </a:lnSpc>
+              <a:spcBef>
+                <a:spcPts val="1000"/>
+              </a:spcBef>
+              <a:buFont typeface="Arial" panose="020B0604020202020204" pitchFamily="34" charset="0"/>
+              <a:buChar char="•"/>
+              <a:defRPr sz="2800" kern="1200">
+                <a:solidFill>
+                  <a:schemeClr val="tx1"/>
+                </a:solidFill>
+                <a:latin typeface="+mn-lt"/>
+                <a:ea typeface="+mn-ea"/>
+                <a:cs typeface="+mn-cs"/>
+              </a:defRPr>
+            </a:lvl1pPr>
+            <a:lvl2pPr marL="685800" indent="-228600" algn="l" defTabSz="914400" rtl="0" eaLnBrk="1" latinLnBrk="0" hangingPunct="1">
+              <a:lnSpc>
+                <a:spcPct val="90000"/>
+              </a:lnSpc>
+              <a:spcBef>
+                <a:spcPts val="500"/>
+              </a:spcBef>
+              <a:buFont typeface="Arial" panose="020B0604020202020204" pitchFamily="34" charset="0"/>
+              <a:buChar char="•"/>
+              <a:defRPr sz="2400" kern="1200">
+                <a:solidFill>
+                  <a:schemeClr val="tx1"/>
+                </a:solidFill>
+                <a:latin typeface="+mn-lt"/>
+                <a:ea typeface="+mn-ea"/>
+                <a:cs typeface="+mn-cs"/>
+              </a:defRPr>
+            </a:lvl2pPr>
+            <a:lvl3pPr marL="1143000" indent="-228600" algn="l" defTabSz="914400" rtl="0" eaLnBrk="1" latinLnBrk="0" hangingPunct="1">
+              <a:lnSpc>
+                <a:spcPct val="90000"/>
+              </a:lnSpc>
+              <a:spcBef>
+                <a:spcPts val="500"/>
+              </a:spcBef>
+              <a:buFont typeface="Arial" panose="020B0604020202020204" pitchFamily="34" charset="0"/>
+              <a:buChar char="•"/>
+              <a:defRPr sz="2000" kern="1200">
+                <a:solidFill>
+                  <a:schemeClr val="tx1"/>
+                </a:solidFill>
+                <a:latin typeface="+mn-lt"/>
+                <a:ea typeface="+mn-ea"/>
+                <a:cs typeface="+mn-cs"/>
+              </a:defRPr>
+            </a:lvl3pPr>
+            <a:lvl4pPr marL="1600200" indent="-228600" algn="l" defTabSz="914400" rtl="0" eaLnBrk="1" latinLnBrk="0" hangingPunct="1">
+              <a:lnSpc>
+                <a:spcPct val="90000"/>
+              </a:lnSpc>
+              <a:spcBef>
+                <a:spcPts val="500"/>
+              </a:spcBef>
+              <a:buFont typeface="Arial" panose="020B0604020202020204" pitchFamily="34" charset="0"/>
+              <a:buChar char="•"/>
+              <a:defRPr sz="1800" kern="1200">
+                <a:solidFill>
+                  <a:schemeClr val="tx1"/>
+                </a:solidFill>
+                <a:latin typeface="+mn-lt"/>
+                <a:ea typeface="+mn-ea"/>
+                <a:cs typeface="+mn-cs"/>
+              </a:defRPr>
+            </a:lvl4pPr>
+            <a:lvl5pPr marL="2057400" indent="-228600" algn="l" defTabSz="914400" rtl="0" eaLnBrk="1" latinLnBrk="0" hangingPunct="1">
+              <a:lnSpc>
+                <a:spcPct val="90000"/>
+              </a:lnSpc>
+              <a:spcBef>
+                <a:spcPts val="500"/>
+              </a:spcBef>
+              <a:buFont typeface="Arial" panose="020B0604020202020204" pitchFamily="34" charset="0"/>
+              <a:buChar char="•"/>
+              <a:defRPr sz="1800" kern="1200">
+                <a:solidFill>
+                  <a:schemeClr val="tx1"/>
+                </a:solidFill>
+                <a:latin typeface="+mn-lt"/>
+                <a:ea typeface="+mn-ea"/>
+                <a:cs typeface="+mn-cs"/>
+              </a:defRPr>
+            </a:lvl5pPr>
+            <a:lvl6pPr marL="2514600" indent="-228600" algn="l" defTabSz="914400" rtl="0" eaLnBrk="1" latinLnBrk="0" hangingPunct="1">
+              <a:lnSpc>
+                <a:spcPct val="90000"/>
+              </a:lnSpc>
+              <a:spcBef>
+                <a:spcPts val="500"/>
+              </a:spcBef>
+              <a:buFont typeface="Arial" panose="020B0604020202020204" pitchFamily="34" charset="0"/>
+              <a:buChar char="•"/>
+              <a:defRPr sz="1800" kern="1200">
+                <a:solidFill>
+                  <a:schemeClr val="tx1"/>
+                </a:solidFill>
+                <a:latin typeface="+mn-lt"/>
+                <a:ea typeface="+mn-ea"/>
+                <a:cs typeface="+mn-cs"/>
+              </a:defRPr>
+            </a:lvl6pPr>
+            <a:lvl7pPr marL="2971800" indent="-228600" algn="l" defTabSz="914400" rtl="0" eaLnBrk="1" latinLnBrk="0" hangingPunct="1">
+              <a:lnSpc>
+                <a:spcPct val="90000"/>
+              </a:lnSpc>
+              <a:spcBef>
+                <a:spcPts val="500"/>
+              </a:spcBef>
+              <a:buFont typeface="Arial" panose="020B0604020202020204" pitchFamily="34" charset="0"/>
+              <a:buChar char="•"/>
+              <a:defRPr sz="1800" kern="1200">
+                <a:solidFill>
+                  <a:schemeClr val="tx1"/>
+                </a:solidFill>
+                <a:latin typeface="+mn-lt"/>
+                <a:ea typeface="+mn-ea"/>
+                <a:cs typeface="+mn-cs"/>
+              </a:defRPr>
+            </a:lvl7pPr>
+            <a:lvl8pPr marL="3429000" indent="-228600" algn="l" defTabSz="914400" rtl="0" eaLnBrk="1" latinLnBrk="0" hangingPunct="1">
+              <a:lnSpc>
+                <a:spcPct val="90000"/>
+              </a:lnSpc>
+              <a:spcBef>
+                <a:spcPts val="500"/>
+              </a:spcBef>
+              <a:buFont typeface="Arial" panose="020B0604020202020204" pitchFamily="34" charset="0"/>
+              <a:buChar char="•"/>
+              <a:defRPr sz="1800" kern="1200">
+                <a:solidFill>
+                  <a:schemeClr val="tx1"/>
+                </a:solidFill>
+                <a:latin typeface="+mn-lt"/>
+                <a:ea typeface="+mn-ea"/>
+                <a:cs typeface="+mn-cs"/>
+              </a:defRPr>
+            </a:lvl8pPr>
+            <a:lvl9pPr marL="3886200" indent="-228600" algn="l" defTabSz="914400" rtl="0" eaLnBrk="1" latinLnBrk="0" hangingPunct="1">
+              <a:lnSpc>
+                <a:spcPct val="90000"/>
+              </a:lnSpc>
+              <a:spcBef>
+                <a:spcPts val="500"/>
+              </a:spcBef>
+              <a:buFont typeface="Arial" panose="020B0604020202020204" pitchFamily="34" charset="0"/>
+              <a:buChar char="•"/>
+              <a:defRPr sz="1800" kern="1200">
+                <a:solidFill>
+                  <a:schemeClr val="tx1"/>
+                </a:solidFill>
+                <a:latin typeface="+mn-lt"/>
+                <a:ea typeface="+mn-ea"/>
+                <a:cs typeface="+mn-cs"/>
+              </a:defRPr>
+            </a:lvl9pPr>
+          </a:lstStyle>
+          <a:p>
+            <a:r>
+              <a:rPr lang="it-IT" sz="3200" dirty="0">
+                <a:latin typeface="Figtree" pitchFamily="2" charset="0"/>
+                <a:ea typeface="Verdana"/>
+                <a:cs typeface="Arial"/>
+              </a:rPr>
+              <a:t>Contenuto</a:t>
+            </a:r>
+          </a:p>
+        </p:txBody>
+      </p:sp>
+      <p:pic>
+        <p:nvPicPr>
+          <p:cNvPr id="10" name="Graphic 9">
+            <a:extLst>
+              <a:ext uri="{FF2B5EF4-FFF2-40B4-BE49-F238E27FC236}">
+                <a16:creationId xmlns:a16="http://schemas.microsoft.com/office/drawing/2014/main" id="{DAD59CED-4245-CF80-99CE-4406CEC50BCD}"/>
+              </a:ext>
+            </a:extLst>
+          </p:cNvPr>
+          <p:cNvPicPr>
+            <a:picLocks noChangeAspect="1"/>
+          </p:cNvPicPr>
+          <p:nvPr/>
+        </p:nvPicPr>
+        <p:blipFill>
+          <a:blip r:embed="rId2">
+            <a:extLst>
+              <a:ext uri="{96DAC541-7B7A-43D3-8B79-37D633B846F1}">
+                <asvg:svgBlip xmlns:asvg="http://schemas.microsoft.com/office/drawing/2016/SVG/main" r:embed="rId3"/>
+              </a:ext>
+            </a:extLst>
+          </a:blip>
+          <a:stretch>
+            <a:fillRect/>
+          </a:stretch>
+        </p:blipFill>
+        <p:spPr>
+          <a:xfrm>
+            <a:off x="11552664" y="5965902"/>
+            <a:ext cx="477412" cy="763859"/>
+          </a:xfrm>
+          <a:prstGeom prst="rect">
+            <a:avLst/>
+          </a:prstGeom>
+        </p:spPr>
+      </p:pic>
+    </p:spTree>
+    <p:extLst>
+      <p:ext uri="{BB962C8B-B14F-4D97-AF65-F5344CB8AC3E}">
+        <p14:creationId xmlns:p14="http://schemas.microsoft.com/office/powerpoint/2010/main" val="269967434"/>
       </p:ext>
     </p:extLst>
   </p:cSld>

</xml_diff>